<commit_message>
add DXUTCamera & add CUBE Mesh
</commit_message>
<xml_diff>
--- a/Document/DXUT & ASSIMP(2).pptx
+++ b/Document/DXUT & ASSIMP(2).pptx
@@ -114,6 +114,11 @@
       </a:defRPr>
     </a:lvl9pPr>
   </p:defaultTextStyle>
+  <p:extLst>
+    <p:ext uri="{EFAFB233-063F-42B5-8137-9DF3F51BA10A}">
+      <p15:sldGuideLst xmlns:p15="http://schemas.microsoft.com/office/powerpoint/2012/main"/>
+    </p:ext>
+  </p:extLst>
 </p:presentation>
 </file>
 
@@ -248,7 +253,7 @@
           <a:p>
             <a:fld id="{8988811B-9313-46B9-BCC9-4DB11F3218A8}" type="datetimeFigureOut">
               <a:rPr lang="ko-KR" altLang="en-US" smtClean="0"/>
-              <a:t>2015-08-08</a:t>
+              <a:t>2015-08-09</a:t>
             </a:fld>
             <a:endParaRPr lang="ko-KR" altLang="en-US"/>
           </a:p>
@@ -418,7 +423,7 @@
           <a:p>
             <a:fld id="{8988811B-9313-46B9-BCC9-4DB11F3218A8}" type="datetimeFigureOut">
               <a:rPr lang="ko-KR" altLang="en-US" smtClean="0"/>
-              <a:t>2015-08-08</a:t>
+              <a:t>2015-08-09</a:t>
             </a:fld>
             <a:endParaRPr lang="ko-KR" altLang="en-US"/>
           </a:p>
@@ -598,7 +603,7 @@
           <a:p>
             <a:fld id="{8988811B-9313-46B9-BCC9-4DB11F3218A8}" type="datetimeFigureOut">
               <a:rPr lang="ko-KR" altLang="en-US" smtClean="0"/>
-              <a:t>2015-08-08</a:t>
+              <a:t>2015-08-09</a:t>
             </a:fld>
             <a:endParaRPr lang="ko-KR" altLang="en-US"/>
           </a:p>
@@ -768,7 +773,7 @@
           <a:p>
             <a:fld id="{8988811B-9313-46B9-BCC9-4DB11F3218A8}" type="datetimeFigureOut">
               <a:rPr lang="ko-KR" altLang="en-US" smtClean="0"/>
-              <a:t>2015-08-08</a:t>
+              <a:t>2015-08-09</a:t>
             </a:fld>
             <a:endParaRPr lang="ko-KR" altLang="en-US"/>
           </a:p>
@@ -1014,7 +1019,7 @@
           <a:p>
             <a:fld id="{8988811B-9313-46B9-BCC9-4DB11F3218A8}" type="datetimeFigureOut">
               <a:rPr lang="ko-KR" altLang="en-US" smtClean="0"/>
-              <a:t>2015-08-08</a:t>
+              <a:t>2015-08-09</a:t>
             </a:fld>
             <a:endParaRPr lang="ko-KR" altLang="en-US"/>
           </a:p>
@@ -1246,7 +1251,7 @@
           <a:p>
             <a:fld id="{8988811B-9313-46B9-BCC9-4DB11F3218A8}" type="datetimeFigureOut">
               <a:rPr lang="ko-KR" altLang="en-US" smtClean="0"/>
-              <a:t>2015-08-08</a:t>
+              <a:t>2015-08-09</a:t>
             </a:fld>
             <a:endParaRPr lang="ko-KR" altLang="en-US"/>
           </a:p>
@@ -1613,7 +1618,7 @@
           <a:p>
             <a:fld id="{8988811B-9313-46B9-BCC9-4DB11F3218A8}" type="datetimeFigureOut">
               <a:rPr lang="ko-KR" altLang="en-US" smtClean="0"/>
-              <a:t>2015-08-08</a:t>
+              <a:t>2015-08-09</a:t>
             </a:fld>
             <a:endParaRPr lang="ko-KR" altLang="en-US"/>
           </a:p>
@@ -1731,7 +1736,7 @@
           <a:p>
             <a:fld id="{8988811B-9313-46B9-BCC9-4DB11F3218A8}" type="datetimeFigureOut">
               <a:rPr lang="ko-KR" altLang="en-US" smtClean="0"/>
-              <a:t>2015-08-08</a:t>
+              <a:t>2015-08-09</a:t>
             </a:fld>
             <a:endParaRPr lang="ko-KR" altLang="en-US"/>
           </a:p>
@@ -1826,7 +1831,7 @@
           <a:p>
             <a:fld id="{8988811B-9313-46B9-BCC9-4DB11F3218A8}" type="datetimeFigureOut">
               <a:rPr lang="ko-KR" altLang="en-US" smtClean="0"/>
-              <a:t>2015-08-08</a:t>
+              <a:t>2015-08-09</a:t>
             </a:fld>
             <a:endParaRPr lang="ko-KR" altLang="en-US"/>
           </a:p>
@@ -2103,7 +2108,7 @@
           <a:p>
             <a:fld id="{8988811B-9313-46B9-BCC9-4DB11F3218A8}" type="datetimeFigureOut">
               <a:rPr lang="ko-KR" altLang="en-US" smtClean="0"/>
-              <a:t>2015-08-08</a:t>
+              <a:t>2015-08-09</a:t>
             </a:fld>
             <a:endParaRPr lang="ko-KR" altLang="en-US"/>
           </a:p>
@@ -2356,7 +2361,7 @@
           <a:p>
             <a:fld id="{8988811B-9313-46B9-BCC9-4DB11F3218A8}" type="datetimeFigureOut">
               <a:rPr lang="ko-KR" altLang="en-US" smtClean="0"/>
-              <a:t>2015-08-08</a:t>
+              <a:t>2015-08-09</a:t>
             </a:fld>
             <a:endParaRPr lang="ko-KR" altLang="en-US"/>
           </a:p>
@@ -2569,7 +2574,7 @@
           <a:p>
             <a:fld id="{8988811B-9313-46B9-BCC9-4DB11F3218A8}" type="datetimeFigureOut">
               <a:rPr lang="ko-KR" altLang="en-US" smtClean="0"/>
-              <a:t>2015-08-08</a:t>
+              <a:t>2015-08-09</a:t>
             </a:fld>
             <a:endParaRPr lang="ko-KR" altLang="en-US"/>
           </a:p>
@@ -3316,7 +3321,42 @@
           <a:p>
             <a:r>
               <a:rPr lang="ko-KR" altLang="en-US" dirty="0" smtClean="0"/>
-              <a:t>카메라와 매시를 추가하여 간단한 </a:t>
+              <a:t>다음 장에서는 </a:t>
+            </a:r>
+            <a:r>
+              <a:rPr lang="en-US" altLang="ko-KR" dirty="0" smtClean="0"/>
+              <a:t>ASSIMP</a:t>
+            </a:r>
+            <a:r>
+              <a:rPr lang="ko-KR" altLang="en-US" dirty="0" smtClean="0"/>
+              <a:t>를 </a:t>
+            </a:r>
+            <a:r>
+              <a:rPr lang="en-US" altLang="ko-KR" dirty="0" smtClean="0"/>
+              <a:t>CMAKE</a:t>
+            </a:r>
+            <a:r>
+              <a:rPr lang="ko-KR" altLang="en-US" dirty="0" smtClean="0"/>
+              <a:t>를 이용해 </a:t>
+            </a:r>
+            <a:r>
+              <a:rPr lang="ko-KR" altLang="en-US" dirty="0" err="1" smtClean="0"/>
+              <a:t>빌드와</a:t>
+            </a:r>
+            <a:r>
+              <a:rPr lang="ko-KR" altLang="en-US" smtClean="0"/>
+              <a:t> 컴파일 까지</a:t>
+            </a:r>
+            <a:endParaRPr lang="en-US" altLang="ko-KR" smtClean="0"/>
+          </a:p>
+          <a:p>
+            <a:r>
+              <a:rPr lang="ko-KR" altLang="en-US" dirty="0" smtClean="0"/>
+              <a:t>다 다음 장에서는 카메라와 </a:t>
+            </a:r>
+            <a:r>
+              <a:rPr lang="ko-KR" altLang="en-US" dirty="0" smtClean="0"/>
+              <a:t>매시를 추가하여 간단한 </a:t>
             </a:r>
             <a:r>
               <a:rPr lang="en-US" altLang="ko-KR" dirty="0" smtClean="0"/>

</xml_diff>